<commit_message>
Resolução de conflitos no ficheiro
</commit_message>
<xml_diff>
--- a/aulas/t/SCO-T1-A07-A08.pptx
+++ b/aulas/t/SCO-T1-A07-A08.pptx
@@ -3519,7 +3519,33 @@
           <a:bodyPr/>
           <a:lstStyle/>
           <a:p>
-            <a:endParaRPr lang="en-GB" dirty="0"/>
+            <a:pPr marL="0" marR="0" lvl="0" indent="0" algn="l" defTabSz="914400" rtl="0" eaLnBrk="1" fontAlgn="base" latinLnBrk="0" hangingPunct="1">
+              <a:lnSpc>
+                <a:spcPct val="100000"/>
+              </a:lnSpc>
+              <a:spcBef>
+                <a:spcPct val="30000"/>
+              </a:spcBef>
+              <a:spcAft>
+                <a:spcPct val="0"/>
+              </a:spcAft>
+              <a:buClrTx/>
+              <a:buSzTx/>
+              <a:buFontTx/>
+              <a:buNone/>
+              <a:tabLst/>
+              <a:defRPr/>
+            </a:pPr>
+            <a:r>
+              <a:rPr lang="en-GB" dirty="0"/>
+              <a:t>https://en.wikipedia.org/wiki/Call_stack</a:t>
+            </a:r>
+          </a:p>
+          <a:p>
+            <a:r>
+              <a:rPr lang="en-GB" dirty="0"/>
+              <a:t>https://en.wikipedia.org/wiki/Stack-based_memory_allocation</a:t>
+            </a:r>
           </a:p>
         </p:txBody>
       </p:sp>
@@ -14133,7 +14159,7 @@
             </a:pPr>
             <a:r>
               <a:rPr lang="pt-PT" sz="1600" b="0" i="0" dirty="0"/>
-              <a:t>É possível utilizar registos de entrada também como de saída. Por exemplos, os parâmetros designados de entrada/saída, mas não com endereços/ponteiros;</a:t>
+              <a:t>É possível utilizar registos de entrada também como de saída. Por exemplos, os parâmetros designados de entrada/saída, mas não como endereços/ponteiros;</a:t>
             </a:r>
           </a:p>
           <a:p>
@@ -14146,7 +14172,7 @@
             </a:pPr>
             <a:r>
               <a:rPr lang="pt-PT" sz="1600" b="0" i="0" dirty="0"/>
-              <a:t>As passagens por referência, os endereços/ponteiros para os dados que são colocado nos registos;</a:t>
+              <a:t>A passagem por referência é implementada com os endereços/ponteiros para os dados que são colocados nos registos, no entanto passamos o “valor” do local (endereço);</a:t>
             </a:r>
           </a:p>
           <a:p>
@@ -14731,25 +14757,8 @@
                 <a:latin typeface="Courier New" panose="02070309020205020404" pitchFamily="49" charset="0"/>
                 <a:cs typeface="Courier New" panose="02070309020205020404" pitchFamily="49" charset="0"/>
               </a:rPr>
-              <a:t>LENCICLE	ldr r2, [r0], #4	;get char and post </a:t>
-            </a:r>
-            <a:r>
-              <a:rPr lang="en-US" sz="1200" i="0" dirty="0" err="1">
-                <a:solidFill>
-                  <a:schemeClr val="accent2"/>
-                </a:solidFill>
-                <a:latin typeface="Courier New" panose="02070309020205020404" pitchFamily="49" charset="0"/>
-                <a:cs typeface="Courier New" panose="02070309020205020404" pitchFamily="49" charset="0"/>
-              </a:rPr>
-              <a:t>incrment</a:t>
-            </a:r>
-            <a:endParaRPr lang="en-US" sz="1200" i="0" dirty="0">
-              <a:solidFill>
-                <a:schemeClr val="accent2"/>
-              </a:solidFill>
-              <a:latin typeface="Courier New" panose="02070309020205020404" pitchFamily="49" charset="0"/>
-              <a:cs typeface="Courier New" panose="02070309020205020404" pitchFamily="49" charset="0"/>
-            </a:endParaRPr>
+              <a:t>LENCICLE	ldr r2, [r0], #4	;get char and post increment</a:t>
+            </a:r>
           </a:p>
           <a:p>
             <a:pPr marL="179388" lvl="1" algn="just" defTabSz="624078">
@@ -15129,7 +15138,7 @@
             </a:pPr>
             <a:r>
               <a:rPr lang="pt-PT" sz="1600" b="0" i="0" dirty="0"/>
-              <a:t>É definida uma zona de memoria associada à subrotina onde são colocados os valores de entrada por quem “chama”. A subrotina lê dessa zona os dados de entrada, colocando nessa zona, nos locais para isso reservados, os valores de saída;</a:t>
+              <a:t>É definida uma zona de memoria “associada” à subrotina onde são colocados os valores de entrada por quem “chama”. A subrotina lê dessa zona os dados de entrada, colocando também nessa zona, nos locais para isso reservados, os valores de saída;</a:t>
             </a:r>
           </a:p>
           <a:p>
@@ -15189,7 +15198,7 @@
             </a:pPr>
             <a:r>
               <a:rPr lang="pt-PT" sz="1600" b="0" i="0" dirty="0"/>
-              <a:t>Dependendo do modelo de organização de código/dados, a zona associada a uma subrotina pode estar junta ou separada em termos de endereços da subrotina.</a:t>
+              <a:t>Dependendo do modelo de organização de código/dados, a zona “associada” a uma subrotina pode estar junta ou separada em termos de endereços da subrotina.</a:t>
             </a:r>
           </a:p>
         </p:txBody>
@@ -15493,7 +15502,7 @@
                 <a:latin typeface="Courier New" panose="02070309020205020404" pitchFamily="49" charset="0"/>
                 <a:cs typeface="Courier New" panose="02070309020205020404" pitchFamily="49" charset="0"/>
               </a:rPr>
-              <a:t>SUBR1_A	FILL 1		</a:t>
+              <a:t>SUBR1_A	FILL 4		</a:t>
             </a:r>
           </a:p>
           <a:p>
@@ -15510,7 +15519,7 @@
                 <a:latin typeface="Courier New" panose="02070309020205020404" pitchFamily="49" charset="0"/>
                 <a:cs typeface="Courier New" panose="02070309020205020404" pitchFamily="49" charset="0"/>
               </a:rPr>
-              <a:t>SUBR1_B	FILL 1		</a:t>
+              <a:t>SUBR1_B	FILL 4		</a:t>
             </a:r>
           </a:p>
           <a:p>
@@ -15527,7 +15536,27 @@
                 <a:latin typeface="Courier New" panose="02070309020205020404" pitchFamily="49" charset="0"/>
                 <a:cs typeface="Courier New" panose="02070309020205020404" pitchFamily="49" charset="0"/>
               </a:rPr>
-              <a:t>SUBR1_R	FILL 1		</a:t>
+              <a:t>SUBR1_R	</a:t>
+            </a:r>
+            <a:r>
+              <a:rPr lang="en-US" sz="1200" i="0">
+                <a:solidFill>
+                  <a:schemeClr val="accent2"/>
+                </a:solidFill>
+                <a:latin typeface="Courier New" panose="02070309020205020404" pitchFamily="49" charset="0"/>
+                <a:cs typeface="Courier New" panose="02070309020205020404" pitchFamily="49" charset="0"/>
+              </a:rPr>
+              <a:t>FILL 4</a:t>
+            </a:r>
+            <a:r>
+              <a:rPr lang="en-US" sz="1200" i="0" dirty="0">
+                <a:solidFill>
+                  <a:schemeClr val="accent2"/>
+                </a:solidFill>
+                <a:latin typeface="Courier New" panose="02070309020205020404" pitchFamily="49" charset="0"/>
+                <a:cs typeface="Courier New" panose="02070309020205020404" pitchFamily="49" charset="0"/>
+              </a:rPr>
+              <a:t>		</a:t>
             </a:r>
           </a:p>
           <a:p>
@@ -16126,7 +16155,7 @@
                 <a:latin typeface="Courier New" panose="02070309020205020404" pitchFamily="49" charset="0"/>
                 <a:cs typeface="Courier New" panose="02070309020205020404" pitchFamily="49" charset="0"/>
               </a:rPr>
-              <a:t>	adr r0, SUBR1_A </a:t>
+              <a:t>	adr r0, SUBR1_A 	;A value address in associated memory</a:t>
             </a:r>
           </a:p>
           <a:p>
@@ -16160,7 +16189,7 @@
                 <a:latin typeface="Courier New" panose="02070309020205020404" pitchFamily="49" charset="0"/>
                 <a:cs typeface="Courier New" panose="02070309020205020404" pitchFamily="49" charset="0"/>
               </a:rPr>
-              <a:t>		adr r0, SUBR1_B </a:t>
+              <a:t>		adr r0, SUBR1_B 	;B value address in associated memory</a:t>
             </a:r>
           </a:p>
           <a:p>
@@ -16194,7 +16223,7 @@
                 <a:latin typeface="Courier New" panose="02070309020205020404" pitchFamily="49" charset="0"/>
                 <a:cs typeface="Courier New" panose="02070309020205020404" pitchFamily="49" charset="0"/>
               </a:rPr>
-              <a:t>		add r0, r1, r2	;add values</a:t>
+              <a:t>		add r3, r1, r2	;add values in associated memory</a:t>
             </a:r>
           </a:p>
           <a:p>
@@ -16211,7 +16240,27 @@
                 <a:latin typeface="Courier New" panose="02070309020205020404" pitchFamily="49" charset="0"/>
                 <a:cs typeface="Courier New" panose="02070309020205020404" pitchFamily="49" charset="0"/>
               </a:rPr>
-              <a:t>		adr r1, SUBR1_R</a:t>
+              <a:t>		</a:t>
+            </a:r>
+            <a:r>
+              <a:rPr lang="en-US" sz="1200" i="0" dirty="0" err="1">
+                <a:solidFill>
+                  <a:schemeClr val="accent2"/>
+                </a:solidFill>
+                <a:latin typeface="Courier New" panose="02070309020205020404" pitchFamily="49" charset="0"/>
+                <a:cs typeface="Courier New" panose="02070309020205020404" pitchFamily="49" charset="0"/>
+              </a:rPr>
+              <a:t>adr</a:t>
+            </a:r>
+            <a:r>
+              <a:rPr lang="en-US" sz="1200" i="0" dirty="0">
+                <a:solidFill>
+                  <a:schemeClr val="accent2"/>
+                </a:solidFill>
+                <a:latin typeface="Courier New" panose="02070309020205020404" pitchFamily="49" charset="0"/>
+                <a:cs typeface="Courier New" panose="02070309020205020404" pitchFamily="49" charset="0"/>
+              </a:rPr>
+              <a:t> r0, SUBR1_R	;R value address</a:t>
             </a:r>
           </a:p>
           <a:p>
@@ -16228,7 +16277,7 @@
                 <a:latin typeface="Courier New" panose="02070309020205020404" pitchFamily="49" charset="0"/>
                 <a:cs typeface="Courier New" panose="02070309020205020404" pitchFamily="49" charset="0"/>
               </a:rPr>
-              <a:t>		str r0, [r1]	 	;put r0 in SUBR1_R </a:t>
+              <a:t>		str r3, [r0]	 	;put r0 in SUBR1_R </a:t>
             </a:r>
           </a:p>
           <a:p>
@@ -16653,12 +16702,28 @@
               <a:buChar char="Ø"/>
             </a:pPr>
             <a:r>
+              <a:rPr lang="pt-PT" sz="1600" b="0" i="0" dirty="0"/>
+              <a:t>Mais recentemente o</a:t>
+            </a:r>
+            <a:r>
               <a:rPr lang="pt-PT" sz="1600" b="0" dirty="0"/>
-              <a:t>Frame Point</a:t>
+              <a:t> </a:t>
+            </a:r>
+            <a:r>
+              <a:rPr lang="pt-PT" sz="1600" b="0" dirty="0" err="1"/>
+              <a:t>Frame</a:t>
+            </a:r>
+            <a:r>
+              <a:rPr lang="pt-PT" sz="1600" b="0" dirty="0"/>
+              <a:t> </a:t>
+            </a:r>
+            <a:r>
+              <a:rPr lang="pt-PT" sz="1600" b="0" dirty="0" err="1"/>
+              <a:t>Point</a:t>
             </a:r>
             <a:r>
               <a:rPr lang="pt-PT" sz="1600" b="0" i="0" dirty="0"/>
-              <a:t> também é designado por chamada por </a:t>
+              <a:t> foi designado com chamada por </a:t>
             </a:r>
             <a:r>
               <a:rPr lang="pt-PT" sz="1600" b="0" dirty="0"/>
@@ -17332,7 +17397,7 @@
         <p:spPr bwMode="auto">
           <a:xfrm>
             <a:off x="540000" y="900000"/>
-            <a:ext cx="8424488" cy="3077369"/>
+            <a:ext cx="8424488" cy="3599370"/>
           </a:xfrm>
           <a:prstGeom prst="rect">
             <a:avLst/>
@@ -17367,136 +17432,6 @@
             </a:r>
           </a:p>
           <a:p>
-            <a:pPr marL="179388" lvl="1" algn="just" defTabSz="624078">
-              <a:lnSpc>
-                <a:spcPct val="120000"/>
-              </a:lnSpc>
-            </a:pPr>
-            <a:r>
-              <a:rPr lang="en-US" sz="1200" i="0" dirty="0">
-                <a:solidFill>
-                  <a:schemeClr val="accent2"/>
-                </a:solidFill>
-                <a:latin typeface="Courier New" panose="02070309020205020404" pitchFamily="49" charset="0"/>
-                <a:cs typeface="Courier New" panose="02070309020205020404" pitchFamily="49" charset="0"/>
-              </a:rPr>
-              <a:t>int function(int * data, int size)</a:t>
-            </a:r>
-          </a:p>
-          <a:p>
-            <a:pPr marL="179388" lvl="1" algn="just" defTabSz="624078">
-              <a:lnSpc>
-                <a:spcPct val="120000"/>
-              </a:lnSpc>
-            </a:pPr>
-            <a:r>
-              <a:rPr lang="en-US" sz="1200" b="0" i="0" dirty="0">
-                <a:solidFill>
-                  <a:schemeClr val="accent2"/>
-                </a:solidFill>
-                <a:latin typeface="Courier New" panose="02070309020205020404" pitchFamily="49" charset="0"/>
-                <a:cs typeface="Courier New" panose="02070309020205020404" pitchFamily="49" charset="0"/>
-              </a:rPr>
-              <a:t>{</a:t>
-            </a:r>
-          </a:p>
-          <a:p>
-            <a:pPr marL="179388" lvl="1" algn="just" defTabSz="624078">
-              <a:lnSpc>
-                <a:spcPct val="120000"/>
-              </a:lnSpc>
-            </a:pPr>
-            <a:r>
-              <a:rPr lang="en-US" sz="1200" b="0" i="0" dirty="0">
-                <a:solidFill>
-                  <a:schemeClr val="accent2"/>
-                </a:solidFill>
-                <a:latin typeface="Courier New" panose="02070309020205020404" pitchFamily="49" charset="0"/>
-                <a:cs typeface="Courier New" panose="02070309020205020404" pitchFamily="49" charset="0"/>
-              </a:rPr>
-              <a:t>  int sum = 0, a, b; //local variables</a:t>
-            </a:r>
-          </a:p>
-          <a:p>
-            <a:pPr marL="179388" lvl="1" algn="just" defTabSz="624078">
-              <a:lnSpc>
-                <a:spcPct val="120000"/>
-              </a:lnSpc>
-            </a:pPr>
-            <a:endParaRPr lang="en-US" sz="1200" b="0" i="0" dirty="0">
-              <a:solidFill>
-                <a:schemeClr val="accent2"/>
-              </a:solidFill>
-              <a:latin typeface="Courier New" panose="02070309020205020404" pitchFamily="49" charset="0"/>
-              <a:cs typeface="Courier New" panose="02070309020205020404" pitchFamily="49" charset="0"/>
-            </a:endParaRPr>
-          </a:p>
-          <a:p>
-            <a:pPr marL="179388" lvl="1" algn="just" defTabSz="624078">
-              <a:lnSpc>
-                <a:spcPct val="120000"/>
-              </a:lnSpc>
-            </a:pPr>
-            <a:r>
-              <a:rPr lang="en-US" sz="1200" b="0" i="0" dirty="0">
-                <a:solidFill>
-                  <a:schemeClr val="accent2"/>
-                </a:solidFill>
-                <a:latin typeface="Courier New" panose="02070309020205020404" pitchFamily="49" charset="0"/>
-                <a:cs typeface="Courier New" panose="02070309020205020404" pitchFamily="49" charset="0"/>
-              </a:rPr>
-              <a:t>  // function code here</a:t>
-            </a:r>
-          </a:p>
-          <a:p>
-            <a:pPr marL="179388" lvl="1" algn="just" defTabSz="624078">
-              <a:lnSpc>
-                <a:spcPct val="120000"/>
-              </a:lnSpc>
-            </a:pPr>
-            <a:r>
-              <a:rPr lang="en-US" sz="1200" b="0" i="0" dirty="0">
-                <a:solidFill>
-                  <a:schemeClr val="accent2"/>
-                </a:solidFill>
-                <a:latin typeface="Courier New" panose="02070309020205020404" pitchFamily="49" charset="0"/>
-                <a:cs typeface="Courier New" panose="02070309020205020404" pitchFamily="49" charset="0"/>
-              </a:rPr>
-              <a:t>  return sum;</a:t>
-            </a:r>
-          </a:p>
-          <a:p>
-            <a:pPr marL="179388" lvl="1" algn="just" defTabSz="624078">
-              <a:lnSpc>
-                <a:spcPct val="120000"/>
-              </a:lnSpc>
-            </a:pPr>
-            <a:r>
-              <a:rPr lang="en-US" sz="1200" b="0" i="0" dirty="0">
-                <a:solidFill>
-                  <a:schemeClr val="accent2"/>
-                </a:solidFill>
-                <a:latin typeface="Courier New" panose="02070309020205020404" pitchFamily="49" charset="0"/>
-                <a:cs typeface="Courier New" panose="02070309020205020404" pitchFamily="49" charset="0"/>
-              </a:rPr>
-              <a:t>}</a:t>
-            </a:r>
-          </a:p>
-          <a:p>
-            <a:pPr marL="179388" lvl="1" algn="just" defTabSz="624078">
-              <a:lnSpc>
-                <a:spcPct val="120000"/>
-              </a:lnSpc>
-            </a:pPr>
-            <a:endParaRPr lang="en-US" sz="1200" b="0" i="0" dirty="0">
-              <a:solidFill>
-                <a:schemeClr val="accent2"/>
-              </a:solidFill>
-              <a:latin typeface="Courier New" panose="02070309020205020404" pitchFamily="49" charset="0"/>
-              <a:cs typeface="Courier New" panose="02070309020205020404" pitchFamily="49" charset="0"/>
-            </a:endParaRPr>
-          </a:p>
-          <a:p>
             <a:pPr marL="357188" lvl="1" indent="-177800" algn="just" defTabSz="624078">
               <a:lnSpc>
                 <a:spcPct val="120000"/>
@@ -17606,20 +17541,157 @@
               <a:t>Não existe formalmente um nome para o valor de saída mas ele existe no </a:t>
             </a:r>
             <a:r>
-              <a:rPr lang="pt-PT" sz="1600" b="0" dirty="0"/>
+              <a:rPr lang="pt-PT" sz="1600" b="0" dirty="0" err="1"/>
               <a:t>frame</a:t>
             </a:r>
             <a:r>
               <a:rPr lang="pt-PT" sz="1600" b="0" i="0" dirty="0"/>
-              <a:t>.</a:t>
-            </a:r>
-            <a:endParaRPr lang="en-US" sz="1200" b="0" i="0" dirty="0">
+              <a:t>. Conceptualmente o nome da função é o nome da saída.</a:t>
+            </a:r>
+          </a:p>
+          <a:p>
+            <a:pPr marL="179388" lvl="1" algn="just" defTabSz="624078">
+              <a:lnSpc>
+                <a:spcPct val="120000"/>
+              </a:lnSpc>
+            </a:pPr>
+            <a:endParaRPr lang="en-US" sz="1200" i="0" dirty="0">
               <a:solidFill>
                 <a:schemeClr val="accent2"/>
               </a:solidFill>
               <a:latin typeface="Courier New" panose="02070309020205020404" pitchFamily="49" charset="0"/>
               <a:cs typeface="Courier New" panose="02070309020205020404" pitchFamily="49" charset="0"/>
             </a:endParaRPr>
+          </a:p>
+          <a:p>
+            <a:pPr marL="179388" lvl="1" algn="just" defTabSz="624078">
+              <a:lnSpc>
+                <a:spcPct val="120000"/>
+              </a:lnSpc>
+            </a:pPr>
+            <a:r>
+              <a:rPr lang="en-US" sz="1200" i="0" dirty="0">
+                <a:solidFill>
+                  <a:schemeClr val="accent2"/>
+                </a:solidFill>
+                <a:latin typeface="Courier New" panose="02070309020205020404" pitchFamily="49" charset="0"/>
+                <a:cs typeface="Courier New" panose="02070309020205020404" pitchFamily="49" charset="0"/>
+              </a:rPr>
+              <a:t>int function(int * data, int size)</a:t>
+            </a:r>
+          </a:p>
+          <a:p>
+            <a:pPr marL="179388" lvl="1" algn="just" defTabSz="624078">
+              <a:lnSpc>
+                <a:spcPct val="120000"/>
+              </a:lnSpc>
+            </a:pPr>
+            <a:r>
+              <a:rPr lang="en-US" sz="1200" i="0" dirty="0">
+                <a:solidFill>
+                  <a:schemeClr val="accent2"/>
+                </a:solidFill>
+                <a:latin typeface="Courier New" panose="02070309020205020404" pitchFamily="49" charset="0"/>
+                <a:cs typeface="Courier New" panose="02070309020205020404" pitchFamily="49" charset="0"/>
+              </a:rPr>
+              <a:t>{</a:t>
+            </a:r>
+          </a:p>
+          <a:p>
+            <a:pPr marL="179388" lvl="1" algn="just" defTabSz="624078">
+              <a:lnSpc>
+                <a:spcPct val="120000"/>
+              </a:lnSpc>
+            </a:pPr>
+            <a:r>
+              <a:rPr lang="en-US" sz="1200" i="0" dirty="0">
+                <a:solidFill>
+                  <a:schemeClr val="accent2"/>
+                </a:solidFill>
+                <a:latin typeface="Courier New" panose="02070309020205020404" pitchFamily="49" charset="0"/>
+                <a:cs typeface="Courier New" panose="02070309020205020404" pitchFamily="49" charset="0"/>
+              </a:rPr>
+              <a:t>  int sum = 0, a, b; //local variables</a:t>
+            </a:r>
+          </a:p>
+          <a:p>
+            <a:pPr marL="179388" lvl="1" algn="just" defTabSz="624078">
+              <a:lnSpc>
+                <a:spcPct val="120000"/>
+              </a:lnSpc>
+            </a:pPr>
+            <a:endParaRPr lang="en-US" sz="1200" i="0" dirty="0">
+              <a:solidFill>
+                <a:schemeClr val="accent2"/>
+              </a:solidFill>
+              <a:latin typeface="Courier New" panose="02070309020205020404" pitchFamily="49" charset="0"/>
+              <a:cs typeface="Courier New" panose="02070309020205020404" pitchFamily="49" charset="0"/>
+            </a:endParaRPr>
+          </a:p>
+          <a:p>
+            <a:pPr marL="179388" lvl="1" algn="just" defTabSz="624078">
+              <a:lnSpc>
+                <a:spcPct val="120000"/>
+              </a:lnSpc>
+            </a:pPr>
+            <a:r>
+              <a:rPr lang="en-US" sz="1200" i="0" dirty="0">
+                <a:solidFill>
+                  <a:schemeClr val="accent2"/>
+                </a:solidFill>
+                <a:latin typeface="Courier New" panose="02070309020205020404" pitchFamily="49" charset="0"/>
+                <a:cs typeface="Courier New" panose="02070309020205020404" pitchFamily="49" charset="0"/>
+              </a:rPr>
+              <a:t>  // function code here</a:t>
+            </a:r>
+          </a:p>
+          <a:p>
+            <a:pPr marL="179388" lvl="1" algn="just" defTabSz="624078">
+              <a:lnSpc>
+                <a:spcPct val="120000"/>
+              </a:lnSpc>
+            </a:pPr>
+            <a:endParaRPr lang="en-US" sz="1200" i="0" dirty="0">
+              <a:solidFill>
+                <a:schemeClr val="accent2"/>
+              </a:solidFill>
+              <a:latin typeface="Courier New" panose="02070309020205020404" pitchFamily="49" charset="0"/>
+              <a:cs typeface="Courier New" panose="02070309020205020404" pitchFamily="49" charset="0"/>
+            </a:endParaRPr>
+          </a:p>
+          <a:p>
+            <a:pPr marL="179388" lvl="1" algn="just" defTabSz="624078">
+              <a:lnSpc>
+                <a:spcPct val="120000"/>
+              </a:lnSpc>
+            </a:pPr>
+            <a:r>
+              <a:rPr lang="en-US" sz="1200" i="0" dirty="0">
+                <a:solidFill>
+                  <a:schemeClr val="accent2"/>
+                </a:solidFill>
+                <a:latin typeface="Courier New" panose="02070309020205020404" pitchFamily="49" charset="0"/>
+                <a:cs typeface="Courier New" panose="02070309020205020404" pitchFamily="49" charset="0"/>
+              </a:rPr>
+              <a:t>  return sum; //copy value of sum to the function return value</a:t>
+            </a:r>
+          </a:p>
+          <a:p>
+            <a:pPr marL="179388" lvl="1" algn="just" defTabSz="624078">
+              <a:lnSpc>
+                <a:spcPct val="120000"/>
+              </a:lnSpc>
+            </a:pPr>
+            <a:r>
+              <a:rPr lang="en-US" sz="1200" i="0" dirty="0">
+                <a:solidFill>
+                  <a:schemeClr val="accent2"/>
+                </a:solidFill>
+                <a:latin typeface="Courier New" panose="02070309020205020404" pitchFamily="49" charset="0"/>
+                <a:cs typeface="Courier New" panose="02070309020205020404" pitchFamily="49" charset="0"/>
+              </a:rPr>
+              <a:t>}</a:t>
+            </a:r>
           </a:p>
         </p:txBody>
       </p:sp>
@@ -18019,8 +18091,8 @@
         </p:blipFill>
         <p:spPr bwMode="auto">
           <a:xfrm>
-            <a:off x="4472118" y="1921396"/>
-            <a:ext cx="4060322" cy="3312368"/>
+            <a:off x="1157412" y="1993404"/>
+            <a:ext cx="3630612" cy="2961815"/>
           </a:xfrm>
           <a:prstGeom prst="rect">
             <a:avLst/>
@@ -18066,7 +18138,7 @@
         <p:spPr bwMode="auto">
           <a:xfrm>
             <a:off x="540000" y="900000"/>
-            <a:ext cx="8424488" cy="1009110"/>
+            <a:ext cx="4752080" cy="991541"/>
           </a:xfrm>
           <a:prstGeom prst="rect">
             <a:avLst/>
@@ -18110,39 +18182,54 @@
             </a:pPr>
             <a:r>
               <a:rPr lang="pt-PT" sz="1600" b="0" i="0" dirty="0"/>
-              <a:t>Informação, código e exemplos deste método serão apresentados nas aulas PL;</a:t>
-            </a:r>
-          </a:p>
-          <a:p>
-            <a:pPr marL="357188" lvl="1" indent="-177800" algn="just" defTabSz="624078">
-              <a:lnSpc>
-                <a:spcPct val="120000"/>
-              </a:lnSpc>
-              <a:buFont typeface="Wingdings" pitchFamily="2" charset="2"/>
-              <a:buChar char="Ø"/>
-            </a:pPr>
-            <a:r>
-              <a:rPr lang="pt-PT" sz="1600" b="0" i="0" dirty="0"/>
-              <a:t>Diagrama simplificado de um conjunto de </a:t>
-            </a:r>
-            <a:r>
-              <a:rPr lang="pt-PT" sz="1600" b="0" dirty="0"/>
-              <a:t>frames</a:t>
-            </a:r>
-            <a:r>
-              <a:rPr lang="pt-PT" sz="1600" b="0" i="0" dirty="0"/>
-              <a:t>:</a:t>
-            </a:r>
-            <a:endParaRPr lang="en-US" sz="1200" b="0" i="0" dirty="0">
-              <a:solidFill>
-                <a:schemeClr val="accent2"/>
-              </a:solidFill>
-              <a:latin typeface="Courier New" panose="02070309020205020404" pitchFamily="49" charset="0"/>
-              <a:cs typeface="Courier New" panose="02070309020205020404" pitchFamily="49" charset="0"/>
-            </a:endParaRPr>
+              <a:t>Informação, código e exemplos deste método serão apresentados nas aulas PL.</a:t>
+            </a:r>
           </a:p>
         </p:txBody>
       </p:sp>
+      <p:pic>
+        <p:nvPicPr>
+          <p:cNvPr id="2" name="Picture 1">
+            <a:extLst>
+              <a:ext uri="{FF2B5EF4-FFF2-40B4-BE49-F238E27FC236}">
+                <a16:creationId xmlns:a16="http://schemas.microsoft.com/office/drawing/2014/main" id="{309FAD99-4A2E-465B-B37A-BDF2E7655C6B}"/>
+              </a:ext>
+            </a:extLst>
+          </p:cNvPr>
+          <p:cNvPicPr>
+            <a:picLocks noChangeAspect="1"/>
+          </p:cNvPicPr>
+          <p:nvPr/>
+        </p:nvPicPr>
+        <p:blipFill>
+          <a:blip r:embed="rId4"/>
+          <a:stretch>
+            <a:fillRect/>
+          </a:stretch>
+        </p:blipFill>
+        <p:spPr>
+          <a:xfrm>
+            <a:off x="5292080" y="1129308"/>
+            <a:ext cx="3456384" cy="4104456"/>
+          </a:xfrm>
+          <a:prstGeom prst="rect">
+            <a:avLst/>
+          </a:prstGeom>
+          <a:noFill/>
+          <a:ln>
+            <a:solidFill>
+              <a:schemeClr val="accent1"/>
+            </a:solidFill>
+          </a:ln>
+          <a:effectLst>
+            <a:outerShdw blurRad="50800" dist="38100" dir="2700000" algn="tl" rotWithShape="0">
+              <a:prstClr val="black">
+                <a:alpha val="40000"/>
+              </a:prstClr>
+            </a:outerShdw>
+          </a:effectLst>
+        </p:spPr>
+      </p:pic>
     </p:spTree>
     <p:extLst>
       <p:ext uri="{BB962C8B-B14F-4D97-AF65-F5344CB8AC3E}">
@@ -18257,6 +18344,76 @@
                                   </p:childTnLst>
                                 </p:cTn>
                               </p:par>
+                              <p:par>
+                                <p:cTn id="10" presetID="10" presetClass="entr" presetSubtype="0" fill="hold" nodeType="withEffect">
+                                  <p:stCondLst>
+                                    <p:cond delay="0"/>
+                                  </p:stCondLst>
+                                  <p:childTnLst>
+                                    <p:set>
+                                      <p:cBhvr>
+                                        <p:cTn id="11" dur="1" fill="hold">
+                                          <p:stCondLst>
+                                            <p:cond delay="0"/>
+                                          </p:stCondLst>
+                                        </p:cTn>
+                                        <p:tgtEl>
+                                          <p:spTgt spid="1026"/>
+                                        </p:tgtEl>
+                                        <p:attrNameLst>
+                                          <p:attrName>style.visibility</p:attrName>
+                                        </p:attrNameLst>
+                                      </p:cBhvr>
+                                      <p:to>
+                                        <p:strVal val="visible"/>
+                                      </p:to>
+                                    </p:set>
+                                    <p:animEffect transition="in" filter="fade">
+                                      <p:cBhvr>
+                                        <p:cTn id="12" dur="500"/>
+                                        <p:tgtEl>
+                                          <p:spTgt spid="1026"/>
+                                        </p:tgtEl>
+                                      </p:cBhvr>
+                                    </p:animEffect>
+                                  </p:childTnLst>
+                                </p:cTn>
+                              </p:par>
+                              <p:par>
+                                <p:cTn id="13" presetID="10" presetClass="entr" presetSubtype="0" fill="hold" nodeType="withEffect">
+                                  <p:stCondLst>
+                                    <p:cond delay="0"/>
+                                  </p:stCondLst>
+                                  <p:childTnLst>
+                                    <p:set>
+                                      <p:cBhvr>
+                                        <p:cTn id="14" dur="1" fill="hold">
+                                          <p:stCondLst>
+                                            <p:cond delay="0"/>
+                                          </p:stCondLst>
+                                        </p:cTn>
+                                        <p:tgtEl>
+                                          <p:spTgt spid="2"/>
+                                        </p:tgtEl>
+                                        <p:attrNameLst>
+                                          <p:attrName>style.visibility</p:attrName>
+                                        </p:attrNameLst>
+                                      </p:cBhvr>
+                                      <p:to>
+                                        <p:strVal val="visible"/>
+                                      </p:to>
+                                    </p:set>
+                                    <p:animEffect transition="in" filter="fade">
+                                      <p:cBhvr>
+                                        <p:cTn id="15" dur="500"/>
+                                        <p:tgtEl>
+                                          <p:spTgt spid="2"/>
+                                        </p:tgtEl>
+                                      </p:cBhvr>
+                                    </p:animEffect>
+                                  </p:childTnLst>
+                                </p:cTn>
+                              </p:par>
                             </p:childTnLst>
                           </p:cTn>
                         </p:par>
@@ -18343,7 +18500,7 @@
           <a:p>
             <a:pPr algn="r"/>
             <a:br>
-              <a:rPr lang="pt-PT" sz="1000" b="1" i="1" cap="small" dirty="0">
+              <a:rPr lang="pt-PT" sz="1000" b="1" i="1" dirty="0">
                 <a:solidFill>
                   <a:srgbClr val="FF0000"/>
                 </a:solidFill>
@@ -18351,7 +18508,7 @@
               </a:rPr>
             </a:br>
             <a:r>
-              <a:rPr lang="pt-PT" sz="1800" b="1" i="1" cap="small" dirty="0">
+              <a:rPr lang="pt-PT" sz="1600" b="1" i="1" cap="small" dirty="0">
                 <a:solidFill>
                   <a:srgbClr val="FF0000"/>
                 </a:solidFill>
@@ -18379,7 +18536,7 @@
         <p:spPr bwMode="auto">
           <a:xfrm>
             <a:off x="540000" y="900000"/>
-            <a:ext cx="8064448" cy="3938245"/>
+            <a:ext cx="8064448" cy="3568914"/>
           </a:xfrm>
           <a:prstGeom prst="rect">
             <a:avLst/>
@@ -18398,18 +18555,6 @@
             <a:spAutoFit/>
           </a:bodyPr>
           <a:lstStyle/>
-          <a:p>
-            <a:pPr algn="l" defTabSz="704085">
-              <a:lnSpc>
-                <a:spcPct val="120000"/>
-              </a:lnSpc>
-            </a:pPr>
-            <a:r>
-              <a:rPr lang="pt-PT" sz="2000" b="0" i="0" dirty="0"/>
-              <a:t>Questões em:</a:t>
-            </a:r>
-            <a:endParaRPr lang="pt-PT" sz="3600" i="0" dirty="0"/>
-          </a:p>
           <a:p>
             <a:pPr marL="357188" lvl="1" indent="-177800" algn="l" defTabSz="704085">
               <a:lnSpc>

</xml_diff>